<commit_message>
missing data exploration touchdown
</commit_message>
<xml_diff>
--- a/markdown/template.pptx
+++ b/markdown/template.pptx
@@ -211,7 +211,7 @@
           <a:p>
             <a:fld id="{B8042BC7-A105-1C44-B3A6-AF0E814B5493}" type="datetimeFigureOut">
               <a:rPr lang="en-GB" smtClean="0"/>
-              <a:t>02/06/2021</a:t>
+              <a:t>07/05/2023</a:t>
             </a:fld>
             <a:endParaRPr lang="en-GB"/>
           </a:p>
@@ -481,7 +481,7 @@
 
 <file path=ppt/slideLayouts/slideLayout1.xml><?xml version="1.0" encoding="utf-8"?>
 <p:sldLayout xmlns:a="http://schemas.openxmlformats.org/drawingml/2006/main" xmlns:r="http://schemas.openxmlformats.org/officeDocument/2006/relationships" xmlns:p="http://schemas.openxmlformats.org/presentationml/2006/main" type="title" preserve="1">
-  <p:cSld name="1_Title Slide">
+  <p:cSld name="Title Slide">
     <p:spTree>
       <p:nvGrpSpPr>
         <p:cNvPr id="1" name=""/>
@@ -616,7 +616,7 @@
           <a:p>
             <a:fld id="{43455C3B-440F-3444-BF75-9806704B7A54}" type="datetime1">
               <a:rPr lang="de-DE" smtClean="0"/>
-              <a:t>02.06.21</a:t>
+              <a:t>07.05.23</a:t>
             </a:fld>
             <a:endParaRPr lang="en-US" dirty="0"/>
           </a:p>
@@ -656,35 +656,6 @@
           </a:p>
         </p:txBody>
       </p:sp>
-      <p:pic>
-        <p:nvPicPr>
-          <p:cNvPr id="9" name="Grafik 8">
-            <a:extLst>
-              <a:ext uri="{FF2B5EF4-FFF2-40B4-BE49-F238E27FC236}">
-                <a16:creationId xmlns:a16="http://schemas.microsoft.com/office/drawing/2014/main" id="{8B63EA74-7915-BA48-86D8-AE35814BEB54}"/>
-              </a:ext>
-            </a:extLst>
-          </p:cNvPr>
-          <p:cNvPicPr>
-            <a:picLocks noChangeAspect="1"/>
-          </p:cNvPicPr>
-          <p:nvPr userDrawn="1"/>
-        </p:nvPicPr>
-        <p:blipFill rotWithShape="1">
-          <a:blip r:embed="rId2"/>
-          <a:srcRect r="40898" b="4729"/>
-          <a:stretch/>
-        </p:blipFill>
-        <p:spPr>
-          <a:xfrm>
-            <a:off x="215502" y="47760"/>
-            <a:ext cx="2859741" cy="447678"/>
-          </a:xfrm>
-          <a:prstGeom prst="rect">
-            <a:avLst/>
-          </a:prstGeom>
-        </p:spPr>
-      </p:pic>
     </p:spTree>
     <p:extLst>
       <p:ext uri="{BB962C8B-B14F-4D97-AF65-F5344CB8AC3E}">
@@ -816,7 +787,7 @@
           <a:p>
             <a:fld id="{3D0BEC64-E679-014C-AEF6-E91C7200F0A0}" type="datetime1">
               <a:rPr lang="de-DE" smtClean="0"/>
-              <a:t>02.06.21</a:t>
+              <a:t>07.05.23</a:t>
             </a:fld>
             <a:endParaRPr lang="en-US" dirty="0"/>
           </a:p>
@@ -1055,7 +1026,7 @@
           <a:p>
             <a:fld id="{ADC17414-75DC-3F4B-882E-C0F2E1328E60}" type="datetime1">
               <a:rPr lang="de-DE" smtClean="0"/>
-              <a:t>02.06.21</a:t>
+              <a:t>07.05.23</a:t>
             </a:fld>
             <a:endParaRPr lang="en-US" dirty="0"/>
           </a:p>
@@ -1361,7 +1332,7 @@
           <a:p>
             <a:fld id="{7852884E-CE68-544C-B1BB-49E54F88C9E4}" type="datetime1">
               <a:rPr lang="de-DE" smtClean="0"/>
-              <a:t>02.06.21</a:t>
+              <a:t>07.05.23</a:t>
             </a:fld>
             <a:endParaRPr lang="en-US"/>
           </a:p>
@@ -1768,7 +1739,7 @@
           <a:p>
             <a:fld id="{626AC9F9-D111-D443-B98B-E683038B2C95}" type="datetime1">
               <a:rPr lang="de-DE" smtClean="0"/>
-              <a:t>02.06.21</a:t>
+              <a:t>07.05.23</a:t>
             </a:fld>
             <a:endParaRPr lang="en-US"/>
           </a:p>
@@ -1873,7 +1844,7 @@
           <a:p>
             <a:fld id="{5E69D18E-539F-034A-B24C-86245693B065}" type="datetime1">
               <a:rPr lang="de-DE" smtClean="0"/>
-              <a:t>02.06.21</a:t>
+              <a:t>07.05.23</a:t>
             </a:fld>
             <a:endParaRPr lang="en-US"/>
           </a:p>
@@ -2428,6 +2399,306 @@
 </p:sldLayout>
 </file>
 
+<file path=ppt/slideLayouts/slideLayout7.xml><?xml version="1.0" encoding="utf-8"?>
+<p:sldLayout xmlns:a="http://schemas.openxmlformats.org/drawingml/2006/main" xmlns:r="http://schemas.openxmlformats.org/officeDocument/2006/relationships" xmlns:p="http://schemas.openxmlformats.org/presentationml/2006/main" preserve="1" userDrawn="1">
+  <p:cSld name="Blank">
+    <p:spTree>
+      <p:nvGrpSpPr>
+        <p:cNvPr id="1" name=""/>
+        <p:cNvGrpSpPr/>
+        <p:nvPr/>
+      </p:nvGrpSpPr>
+      <p:grpSpPr>
+        <a:xfrm>
+          <a:off x="0" y="0"/>
+          <a:ext cx="0" cy="0"/>
+          <a:chOff x="0" y="0"/>
+          <a:chExt cx="0" cy="0"/>
+        </a:xfrm>
+      </p:grpSpPr>
+      <p:sp>
+        <p:nvSpPr>
+          <p:cNvPr id="2" name="Titel 1">
+            <a:extLst>
+              <a:ext uri="{FF2B5EF4-FFF2-40B4-BE49-F238E27FC236}">
+                <a16:creationId xmlns:a16="http://schemas.microsoft.com/office/drawing/2014/main" id="{39244045-1A07-C63D-99F8-D5879AC64E04}"/>
+              </a:ext>
+            </a:extLst>
+          </p:cNvPr>
+          <p:cNvSpPr>
+            <a:spLocks noGrp="1"/>
+          </p:cNvSpPr>
+          <p:nvPr>
+            <p:ph type="title"/>
+          </p:nvPr>
+        </p:nvSpPr>
+        <p:spPr/>
+        <p:txBody>
+          <a:bodyPr/>
+          <a:lstStyle/>
+          <a:p>
+            <a:r>
+              <a:rPr lang="de-DE"/>
+              <a:t>Mastertitelformat bearbeiten</a:t>
+            </a:r>
+            <a:endParaRPr lang="en-US"/>
+          </a:p>
+        </p:txBody>
+      </p:sp>
+      <p:sp>
+        <p:nvSpPr>
+          <p:cNvPr id="3" name="Datumsplatzhalter 2">
+            <a:extLst>
+              <a:ext uri="{FF2B5EF4-FFF2-40B4-BE49-F238E27FC236}">
+                <a16:creationId xmlns:a16="http://schemas.microsoft.com/office/drawing/2014/main" id="{2B9DF444-F1D5-FB74-89A9-FCEEF0949DA0}"/>
+              </a:ext>
+            </a:extLst>
+          </p:cNvPr>
+          <p:cNvSpPr>
+            <a:spLocks noGrp="1"/>
+          </p:cNvSpPr>
+          <p:nvPr>
+            <p:ph type="dt" sz="half" idx="10"/>
+          </p:nvPr>
+        </p:nvSpPr>
+        <p:spPr/>
+        <p:txBody>
+          <a:bodyPr/>
+          <a:lstStyle/>
+          <a:p>
+            <a:fld id="{1E7BDF19-69AE-D441-B72A-14F9C0B6F6C0}" type="datetime1">
+              <a:rPr lang="de-DE" smtClean="0"/>
+              <a:pPr/>
+              <a:t>07.05.23</a:t>
+            </a:fld>
+            <a:endParaRPr lang="en-US" dirty="0"/>
+          </a:p>
+        </p:txBody>
+      </p:sp>
+      <p:sp>
+        <p:nvSpPr>
+          <p:cNvPr id="4" name="Foliennummernplatzhalter 3">
+            <a:extLst>
+              <a:ext uri="{FF2B5EF4-FFF2-40B4-BE49-F238E27FC236}">
+                <a16:creationId xmlns:a16="http://schemas.microsoft.com/office/drawing/2014/main" id="{F303DB42-EC45-D0D3-0F2F-A032115DD5C8}"/>
+              </a:ext>
+            </a:extLst>
+          </p:cNvPr>
+          <p:cNvSpPr>
+            <a:spLocks noGrp="1"/>
+          </p:cNvSpPr>
+          <p:nvPr>
+            <p:ph type="sldNum" sz="quarter" idx="11"/>
+          </p:nvPr>
+        </p:nvSpPr>
+        <p:spPr/>
+        <p:txBody>
+          <a:bodyPr/>
+          <a:lstStyle/>
+          <a:p>
+            <a:fld id="{F9EA80F1-969D-7843-BBE2-853A1F17A34A}" type="slidenum">
+              <a:rPr lang="en-GB" smtClean="0"/>
+              <a:pPr/>
+              <a:t>‹Nr.›</a:t>
+            </a:fld>
+            <a:endParaRPr lang="en-GB" dirty="0"/>
+          </a:p>
+        </p:txBody>
+      </p:sp>
+    </p:spTree>
+    <p:extLst>
+      <p:ext uri="{BB962C8B-B14F-4D97-AF65-F5344CB8AC3E}">
+        <p14:creationId xmlns:p14="http://schemas.microsoft.com/office/powerpoint/2010/main" val="3816189425"/>
+      </p:ext>
+    </p:extLst>
+  </p:cSld>
+  <p:clrMapOvr>
+    <a:masterClrMapping/>
+  </p:clrMapOvr>
+</p:sldLayout>
+</file>
+
+<file path=ppt/slideLayouts/slideLayout8.xml><?xml version="1.0" encoding="utf-8"?>
+<p:sldLayout xmlns:a="http://schemas.openxmlformats.org/drawingml/2006/main" xmlns:r="http://schemas.openxmlformats.org/officeDocument/2006/relationships" xmlns:p="http://schemas.openxmlformats.org/presentationml/2006/main" preserve="1" userDrawn="1">
+  <p:cSld name="Content with Caption">
+    <p:spTree>
+      <p:nvGrpSpPr>
+        <p:cNvPr id="1" name=""/>
+        <p:cNvGrpSpPr/>
+        <p:nvPr/>
+      </p:nvGrpSpPr>
+      <p:grpSpPr>
+        <a:xfrm>
+          <a:off x="0" y="0"/>
+          <a:ext cx="0" cy="0"/>
+          <a:chOff x="0" y="0"/>
+          <a:chExt cx="0" cy="0"/>
+        </a:xfrm>
+      </p:grpSpPr>
+      <p:sp>
+        <p:nvSpPr>
+          <p:cNvPr id="2" name="Titel 1">
+            <a:extLst>
+              <a:ext uri="{FF2B5EF4-FFF2-40B4-BE49-F238E27FC236}">
+                <a16:creationId xmlns:a16="http://schemas.microsoft.com/office/drawing/2014/main" id="{39244045-1A07-C63D-99F8-D5879AC64E04}"/>
+              </a:ext>
+            </a:extLst>
+          </p:cNvPr>
+          <p:cNvSpPr>
+            <a:spLocks noGrp="1"/>
+          </p:cNvSpPr>
+          <p:nvPr>
+            <p:ph type="title"/>
+          </p:nvPr>
+        </p:nvSpPr>
+        <p:spPr/>
+        <p:txBody>
+          <a:bodyPr/>
+          <a:lstStyle/>
+          <a:p>
+            <a:r>
+              <a:rPr lang="de-DE"/>
+              <a:t>Mastertitelformat bearbeiten</a:t>
+            </a:r>
+            <a:endParaRPr lang="en-US"/>
+          </a:p>
+        </p:txBody>
+      </p:sp>
+      <p:sp>
+        <p:nvSpPr>
+          <p:cNvPr id="3" name="Datumsplatzhalter 2">
+            <a:extLst>
+              <a:ext uri="{FF2B5EF4-FFF2-40B4-BE49-F238E27FC236}">
+                <a16:creationId xmlns:a16="http://schemas.microsoft.com/office/drawing/2014/main" id="{2B9DF444-F1D5-FB74-89A9-FCEEF0949DA0}"/>
+              </a:ext>
+            </a:extLst>
+          </p:cNvPr>
+          <p:cNvSpPr>
+            <a:spLocks noGrp="1"/>
+          </p:cNvSpPr>
+          <p:nvPr>
+            <p:ph type="dt" sz="half" idx="10"/>
+          </p:nvPr>
+        </p:nvSpPr>
+        <p:spPr/>
+        <p:txBody>
+          <a:bodyPr/>
+          <a:lstStyle/>
+          <a:p>
+            <a:fld id="{1E7BDF19-69AE-D441-B72A-14F9C0B6F6C0}" type="datetime1">
+              <a:rPr lang="de-DE" smtClean="0"/>
+              <a:pPr/>
+              <a:t>07.05.23</a:t>
+            </a:fld>
+            <a:endParaRPr lang="en-US" dirty="0"/>
+          </a:p>
+        </p:txBody>
+      </p:sp>
+      <p:sp>
+        <p:nvSpPr>
+          <p:cNvPr id="4" name="Foliennummernplatzhalter 3">
+            <a:extLst>
+              <a:ext uri="{FF2B5EF4-FFF2-40B4-BE49-F238E27FC236}">
+                <a16:creationId xmlns:a16="http://schemas.microsoft.com/office/drawing/2014/main" id="{F303DB42-EC45-D0D3-0F2F-A032115DD5C8}"/>
+              </a:ext>
+            </a:extLst>
+          </p:cNvPr>
+          <p:cNvSpPr>
+            <a:spLocks noGrp="1"/>
+          </p:cNvSpPr>
+          <p:nvPr>
+            <p:ph type="sldNum" sz="quarter" idx="11"/>
+          </p:nvPr>
+        </p:nvSpPr>
+        <p:spPr/>
+        <p:txBody>
+          <a:bodyPr/>
+          <a:lstStyle/>
+          <a:p>
+            <a:fld id="{F9EA80F1-969D-7843-BBE2-853A1F17A34A}" type="slidenum">
+              <a:rPr lang="en-GB" smtClean="0"/>
+              <a:pPr/>
+              <a:t>‹Nr.›</a:t>
+            </a:fld>
+            <a:endParaRPr lang="en-GB" dirty="0"/>
+          </a:p>
+        </p:txBody>
+      </p:sp>
+      <p:sp>
+        <p:nvSpPr>
+          <p:cNvPr id="5" name="Content Placeholder 2">
+            <a:extLst>
+              <a:ext uri="{FF2B5EF4-FFF2-40B4-BE49-F238E27FC236}">
+                <a16:creationId xmlns:a16="http://schemas.microsoft.com/office/drawing/2014/main" id="{E377C279-6338-4D7F-1286-F9DE96EFBA86}"/>
+              </a:ext>
+            </a:extLst>
+          </p:cNvPr>
+          <p:cNvSpPr>
+            <a:spLocks noGrp="1"/>
+          </p:cNvSpPr>
+          <p:nvPr>
+            <p:ph idx="1"/>
+          </p:nvPr>
+        </p:nvSpPr>
+        <p:spPr>
+          <a:xfrm>
+            <a:off x="215502" y="606056"/>
+            <a:ext cx="8715847" cy="4668804"/>
+          </a:xfrm>
+        </p:spPr>
+        <p:txBody>
+          <a:bodyPr/>
+          <a:lstStyle/>
+          <a:p>
+            <a:pPr lvl="0"/>
+            <a:r>
+              <a:rPr lang="en-US"/>
+              <a:t>Click to edit Master text styles</a:t>
+            </a:r>
+          </a:p>
+          <a:p>
+            <a:pPr lvl="1"/>
+            <a:r>
+              <a:rPr lang="en-US"/>
+              <a:t>Second level</a:t>
+            </a:r>
+          </a:p>
+          <a:p>
+            <a:pPr lvl="2"/>
+            <a:r>
+              <a:rPr lang="en-US"/>
+              <a:t>Third level</a:t>
+            </a:r>
+          </a:p>
+          <a:p>
+            <a:pPr lvl="3"/>
+            <a:r>
+              <a:rPr lang="en-US"/>
+              <a:t>Fourth level</a:t>
+            </a:r>
+          </a:p>
+          <a:p>
+            <a:pPr lvl="4"/>
+            <a:r>
+              <a:rPr lang="en-US"/>
+              <a:t>Fifth level</a:t>
+            </a:r>
+          </a:p>
+        </p:txBody>
+      </p:sp>
+    </p:spTree>
+    <p:extLst>
+      <p:ext uri="{BB962C8B-B14F-4D97-AF65-F5344CB8AC3E}">
+        <p14:creationId xmlns:p14="http://schemas.microsoft.com/office/powerpoint/2010/main" val="71460818"/>
+      </p:ext>
+    </p:extLst>
+  </p:cSld>
+  <p:clrMapOvr>
+    <a:masterClrMapping/>
+  </p:clrMapOvr>
+</p:sldLayout>
+</file>
+
 <file path=ppt/slideMasters/slideMaster1.xml><?xml version="1.0" encoding="utf-8"?>
 <p:sldMaster xmlns:a="http://schemas.openxmlformats.org/drawingml/2006/main" xmlns:r="http://schemas.openxmlformats.org/officeDocument/2006/relationships" xmlns:p="http://schemas.openxmlformats.org/presentationml/2006/main" preserve="1">
   <p:cSld>
@@ -2576,7 +2847,7 @@
         <p:spPr>
           <a:xfrm>
             <a:off x="215502" y="91296"/>
-            <a:ext cx="7610061" cy="362266"/>
+            <a:ext cx="7842648" cy="362266"/>
           </a:xfrm>
           <a:prstGeom prst="rect">
             <a:avLst/>
@@ -2692,7 +2963,7 @@
             <a:fld id="{1E7BDF19-69AE-D441-B72A-14F9C0B6F6C0}" type="datetime1">
               <a:rPr lang="de-DE" smtClean="0"/>
               <a:pPr/>
-              <a:t>02.06.21</a:t>
+              <a:t>07.05.23</a:t>
             </a:fld>
             <a:endParaRPr lang="en-US" dirty="0"/>
           </a:p>
@@ -2746,36 +3017,6 @@
           </a:p>
         </p:txBody>
       </p:sp>
-      <p:pic>
-        <p:nvPicPr>
-          <p:cNvPr id="8" name="Grafik 7" descr="Ein Bild, das Text, ClipArt enthält.&#10;&#10;Automatisch generierte Beschreibung">
-            <a:extLst>
-              <a:ext uri="{FF2B5EF4-FFF2-40B4-BE49-F238E27FC236}">
-                <a16:creationId xmlns:a16="http://schemas.microsoft.com/office/drawing/2014/main" id="{1D7B79BC-A195-E94F-AA6F-F1229882FD2D}"/>
-              </a:ext>
-            </a:extLst>
-          </p:cNvPr>
-          <p:cNvPicPr>
-            <a:picLocks noChangeAspect="1"/>
-          </p:cNvPicPr>
-          <p:nvPr userDrawn="1"/>
-        </p:nvPicPr>
-        <p:blipFill>
-          <a:blip r:embed="rId8"/>
-          <a:stretch>
-            <a:fillRect/>
-          </a:stretch>
-        </p:blipFill>
-        <p:spPr>
-          <a:xfrm>
-            <a:off x="7825563" y="91296"/>
-            <a:ext cx="1102935" cy="366988"/>
-          </a:xfrm>
-          <a:prstGeom prst="rect">
-            <a:avLst/>
-          </a:prstGeom>
-        </p:spPr>
-      </p:pic>
       <p:pic>
         <p:nvPicPr>
           <p:cNvPr id="11" name="Grafik 10" descr="Ein Bild, das Text enthält.&#10;&#10;Automatisch generierte Beschreibung">
@@ -2791,7 +3032,7 @@
           <p:nvPr userDrawn="1"/>
         </p:nvPicPr>
         <p:blipFill>
-          <a:blip r:embed="rId9"/>
+          <a:blip r:embed="rId10"/>
           <a:stretch>
             <a:fillRect/>
           </a:stretch>
@@ -2800,6 +3041,36 @@
           <a:xfrm>
             <a:off x="8093862" y="5332237"/>
             <a:ext cx="834636" cy="346162"/>
+          </a:xfrm>
+          <a:prstGeom prst="rect">
+            <a:avLst/>
+          </a:prstGeom>
+        </p:spPr>
+      </p:pic>
+      <p:pic>
+        <p:nvPicPr>
+          <p:cNvPr id="5" name="Grafik 4">
+            <a:extLst>
+              <a:ext uri="{FF2B5EF4-FFF2-40B4-BE49-F238E27FC236}">
+                <a16:creationId xmlns:a16="http://schemas.microsoft.com/office/drawing/2014/main" id="{E759B55D-8762-2D11-D8F2-DBA98E577C1A}"/>
+              </a:ext>
+            </a:extLst>
+          </p:cNvPr>
+          <p:cNvPicPr>
+            <a:picLocks noChangeAspect="1"/>
+          </p:cNvPicPr>
+          <p:nvPr userDrawn="1"/>
+        </p:nvPicPr>
+        <p:blipFill>
+          <a:blip r:embed="rId11"/>
+          <a:stretch>
+            <a:fillRect/>
+          </a:stretch>
+        </p:blipFill>
+        <p:spPr>
+          <a:xfrm>
+            <a:off x="8146172" y="90479"/>
+            <a:ext cx="789068" cy="367446"/>
           </a:xfrm>
           <a:prstGeom prst="rect">
             <a:avLst/>
@@ -2821,6 +3092,8 @@
     <p:sldLayoutId id="2147483652" r:id="rId4"/>
     <p:sldLayoutId id="2147483653" r:id="rId5"/>
     <p:sldLayoutId id="2147483654" r:id="rId6"/>
+    <p:sldLayoutId id="2147483656" r:id="rId7"/>
+    <p:sldLayoutId id="2147483657" r:id="rId8"/>
   </p:sldLayoutIdLst>
   <p:hf hdr="0" ftr="0"/>
   <p:txStyles>
@@ -3174,7 +3447,7 @@
           <a:p>
             <a:fld id="{B6310C1D-D9E8-1742-8052-B258C4C6E9C3}" type="datetime1">
               <a:rPr lang="de-DE" smtClean="0"/>
-              <a:t>02.06.21</a:t>
+              <a:t>07.05.23</a:t>
             </a:fld>
             <a:endParaRPr lang="en-US" dirty="0"/>
           </a:p>

</xml_diff>